<commit_message>
fixing slides and adding fixme
</commit_message>
<xml_diff>
--- a/ClassMaterials/SimpleObjects/Slides/Part3-Statics.pptx
+++ b/ClassMaterials/SimpleObjects/Slides/Part3-Statics.pptx
@@ -178,22 +178,6 @@
     </pc:docChg>
   </pc:docChgLst>
   <pc:docChgLst>
-    <pc:chgData name="Kelly, Jack" userId="S::kellyjc@rose-hulman.edu::a4fd8950-19f5-4a20-8ffc-645900257370" providerId="AD" clId="Web-{83FF7817-F08F-4973-9B88-C8C1006ED1BD}"/>
-    <pc:docChg chg="delSld">
-      <pc:chgData name="Kelly, Jack" userId="S::kellyjc@rose-hulman.edu::a4fd8950-19f5-4a20-8ffc-645900257370" providerId="AD" clId="Web-{83FF7817-F08F-4973-9B88-C8C1006ED1BD}" dt="2022-03-22T06:13:37.090" v="0"/>
-      <pc:docMkLst>
-        <pc:docMk/>
-      </pc:docMkLst>
-      <pc:sldChg chg="del">
-        <pc:chgData name="Kelly, Jack" userId="S::kellyjc@rose-hulman.edu::a4fd8950-19f5-4a20-8ffc-645900257370" providerId="AD" clId="Web-{83FF7817-F08F-4973-9B88-C8C1006ED1BD}" dt="2022-03-22T06:13:37.090" v="0"/>
-        <pc:sldMkLst>
-          <pc:docMk/>
-          <pc:sldMk cId="504009426" sldId="279"/>
-        </pc:sldMkLst>
-      </pc:sldChg>
-    </pc:docChg>
-  </pc:docChgLst>
-  <pc:docChgLst>
     <pc:chgData name="Hollingsworth, Joseph" userId="6338ef61-550f-4a52-a8a3-bd9025908f10" providerId="ADAL" clId="{8B56CC65-205A-F549-A661-F26F4F404A63}"/>
     <pc:docChg chg="modSld">
       <pc:chgData name="Hollingsworth, Joseph" userId="6338ef61-550f-4a52-a8a3-bd9025908f10" providerId="ADAL" clId="{8B56CC65-205A-F549-A661-F26F4F404A63}" dt="2022-03-15T12:39:56.529" v="69" actId="20577"/>
@@ -229,6 +213,22 @@
             <ac:spMk id="229" creationId="{00000000-0000-0000-0000-000000000000}"/>
           </ac:spMkLst>
         </pc:spChg>
+      </pc:sldChg>
+    </pc:docChg>
+  </pc:docChgLst>
+  <pc:docChgLst>
+    <pc:chgData name="Kelly, Jack" userId="S::kellyjc@rose-hulman.edu::a4fd8950-19f5-4a20-8ffc-645900257370" providerId="AD" clId="Web-{83FF7817-F08F-4973-9B88-C8C1006ED1BD}"/>
+    <pc:docChg chg="delSld">
+      <pc:chgData name="Kelly, Jack" userId="S::kellyjc@rose-hulman.edu::a4fd8950-19f5-4a20-8ffc-645900257370" providerId="AD" clId="Web-{83FF7817-F08F-4973-9B88-C8C1006ED1BD}" dt="2022-03-22T06:13:37.090" v="0"/>
+      <pc:docMkLst>
+        <pc:docMk/>
+      </pc:docMkLst>
+      <pc:sldChg chg="del">
+        <pc:chgData name="Kelly, Jack" userId="S::kellyjc@rose-hulman.edu::a4fd8950-19f5-4a20-8ffc-645900257370" providerId="AD" clId="Web-{83FF7817-F08F-4973-9B88-C8C1006ED1BD}" dt="2022-03-22T06:13:37.090" v="0"/>
+        <pc:sldMkLst>
+          <pc:docMk/>
+          <pc:sldMk cId="504009426" sldId="279"/>
+        </pc:sldMkLst>
       </pc:sldChg>
     </pc:docChg>
   </pc:docChgLst>
@@ -847,7 +847,10 @@
           <a:bodyPr/>
           <a:lstStyle/>
           <a:p>
-            <a:endParaRPr lang="en-US" dirty="0"/>
+            <a:r>
+              <a:rPr lang="en-US" dirty="0"/>
+              <a:t>Yoder- I don’t use this normally</a:t>
+            </a:r>
           </a:p>
         </p:txBody>
       </p:sp>
@@ -2254,7 +2257,7 @@
               <a:pPr>
                 <a:defRPr/>
               </a:pPr>
-              <a:t>Monday, February 26, 2024</a:t>
+              <a:t>Tuesday, March 18, 2025</a:t>
             </a:fld>
             <a:endParaRPr lang="en-US" dirty="0"/>
           </a:p>
@@ -2437,7 +2440,7 @@
               <a:pPr>
                 <a:defRPr/>
               </a:pPr>
-              <a:t>Monday, February 26, 2024</a:t>
+              <a:t>Tuesday, March 18, 2025</a:t>
             </a:fld>
             <a:endParaRPr lang="en-US" dirty="0"/>
           </a:p>
@@ -8380,7 +8383,7 @@
 </file>
 
 <file path=ppt/slides/slide4.xml><?xml version="1.0" encoding="utf-8"?>
-<p:sld xmlns:a="http://schemas.openxmlformats.org/drawingml/2006/main" xmlns:r="http://schemas.openxmlformats.org/officeDocument/2006/relationships" xmlns:p="http://schemas.openxmlformats.org/presentationml/2006/main">
+<p:sld xmlns:a="http://schemas.openxmlformats.org/drawingml/2006/main" xmlns:r="http://schemas.openxmlformats.org/officeDocument/2006/relationships" xmlns:p="http://schemas.openxmlformats.org/presentationml/2006/main" show="0">
   <p:cSld>
     <p:spTree>
       <p:nvGrpSpPr>
@@ -11933,14 +11936,12 @@
 </file>
 
 <file path=customXml/item1.xml><?xml version="1.0" encoding="utf-8"?>
-<p:properties xmlns:p="http://schemas.microsoft.com/office/2006/metadata/properties" xmlns:xsi="http://www.w3.org/2001/XMLSchema-instance" xmlns:pc="http://schemas.microsoft.com/office/infopath/2007/PartnerControls">
-  <documentManagement>
-    <TaxCatchAll xmlns="820f9cb1-409d-4c4b-8197-1d4f7dd48124" xsi:nil="true"/>
-    <lcf76f155ced4ddcb4097134ff3c332f xmlns="08600313-7276-4ca7-b5d3-7d86193ee0ac">
-      <Terms xmlns="http://schemas.microsoft.com/office/infopath/2007/PartnerControls"/>
-    </lcf76f155ced4ddcb4097134ff3c332f>
-  </documentManagement>
-</p:properties>
+<?mso-contentType ?>
+<FormTemplates xmlns="http://schemas.microsoft.com/sharepoint/v3/contenttype/forms">
+  <Display>DocumentLibraryForm</Display>
+  <Edit>DocumentLibraryForm</Edit>
+  <New>DocumentLibraryForm</New>
+</FormTemplates>
 </file>
 
 <file path=customXml/item2.xml><?xml version="1.0" encoding="utf-8"?>
@@ -12121,28 +12122,20 @@
 </file>
 
 <file path=customXml/item3.xml><?xml version="1.0" encoding="utf-8"?>
-<?mso-contentType ?>
-<FormTemplates xmlns="http://schemas.microsoft.com/sharepoint/v3/contenttype/forms">
-  <Display>DocumentLibraryForm</Display>
-  <Edit>DocumentLibraryForm</Edit>
-  <New>DocumentLibraryForm</New>
-</FormTemplates>
+<p:properties xmlns:p="http://schemas.microsoft.com/office/2006/metadata/properties" xmlns:xsi="http://www.w3.org/2001/XMLSchema-instance" xmlns:pc="http://schemas.microsoft.com/office/infopath/2007/PartnerControls">
+  <documentManagement>
+    <TaxCatchAll xmlns="820f9cb1-409d-4c4b-8197-1d4f7dd48124" xsi:nil="true"/>
+    <lcf76f155ced4ddcb4097134ff3c332f xmlns="08600313-7276-4ca7-b5d3-7d86193ee0ac">
+      <Terms xmlns="http://schemas.microsoft.com/office/infopath/2007/PartnerControls"/>
+    </lcf76f155ced4ddcb4097134ff3c332f>
+  </documentManagement>
+</p:properties>
 </file>
 
 <file path=customXml/itemProps1.xml><?xml version="1.0" encoding="utf-8"?>
-<ds:datastoreItem xmlns:ds="http://schemas.openxmlformats.org/officeDocument/2006/customXml" ds:itemID="{D29398D1-4D63-4575-9A3C-07E2EFD59027}">
+<ds:datastoreItem xmlns:ds="http://schemas.openxmlformats.org/officeDocument/2006/customXml" ds:itemID="{1F91A352-1F40-4259-97AC-634C68ED9050}">
   <ds:schemaRefs>
-    <ds:schemaRef ds:uri="http://schemas.microsoft.com/office/2006/documentManagement/types"/>
-    <ds:schemaRef ds:uri="http://schemas.microsoft.com/office/infopath/2007/PartnerControls"/>
-    <ds:schemaRef ds:uri="http://schemas.microsoft.com/office/2006/metadata/properties"/>
-    <ds:schemaRef ds:uri="http://www.w3.org/XML/1998/namespace"/>
-    <ds:schemaRef ds:uri="http://purl.org/dc/terms/"/>
-    <ds:schemaRef ds:uri="http://purl.org/dc/dcmitype/"/>
-    <ds:schemaRef ds:uri="http://schemas.openxmlformats.org/package/2006/metadata/core-properties"/>
-    <ds:schemaRef ds:uri="79ddb764-415a-4c38-83b7-908be6382bea"/>
-    <ds:schemaRef ds:uri="http://purl.org/dc/elements/1.1/"/>
-    <ds:schemaRef ds:uri="820f9cb1-409d-4c4b-8197-1d4f7dd48124"/>
-    <ds:schemaRef ds:uri="08600313-7276-4ca7-b5d3-7d86193ee0ac"/>
+    <ds:schemaRef ds:uri="http://schemas.microsoft.com/sharepoint/v3/contenttype/forms"/>
   </ds:schemaRefs>
 </ds:datastoreItem>
 </file>
@@ -12167,9 +12160,19 @@
 </file>
 
 <file path=customXml/itemProps3.xml><?xml version="1.0" encoding="utf-8"?>
-<ds:datastoreItem xmlns:ds="http://schemas.openxmlformats.org/officeDocument/2006/customXml" ds:itemID="{1F91A352-1F40-4259-97AC-634C68ED9050}">
+<ds:datastoreItem xmlns:ds="http://schemas.openxmlformats.org/officeDocument/2006/customXml" ds:itemID="{D29398D1-4D63-4575-9A3C-07E2EFD59027}">
   <ds:schemaRefs>
-    <ds:schemaRef ds:uri="http://schemas.microsoft.com/sharepoint/v3/contenttype/forms"/>
+    <ds:schemaRef ds:uri="http://schemas.microsoft.com/office/2006/documentManagement/types"/>
+    <ds:schemaRef ds:uri="http://schemas.microsoft.com/office/infopath/2007/PartnerControls"/>
+    <ds:schemaRef ds:uri="http://schemas.microsoft.com/office/2006/metadata/properties"/>
+    <ds:schemaRef ds:uri="http://www.w3.org/XML/1998/namespace"/>
+    <ds:schemaRef ds:uri="http://purl.org/dc/terms/"/>
+    <ds:schemaRef ds:uri="http://purl.org/dc/dcmitype/"/>
+    <ds:schemaRef ds:uri="http://schemas.openxmlformats.org/package/2006/metadata/core-properties"/>
+    <ds:schemaRef ds:uri="79ddb764-415a-4c38-83b7-908be6382bea"/>
+    <ds:schemaRef ds:uri="http://purl.org/dc/elements/1.1/"/>
+    <ds:schemaRef ds:uri="820f9cb1-409d-4c4b-8197-1d4f7dd48124"/>
+    <ds:schemaRef ds:uri="08600313-7276-4ca7-b5d3-7d86193ee0ac"/>
   </ds:schemaRefs>
 </ds:datastoreItem>
 </file>
</xml_diff>